<commit_message>
checking in new changes - 02/09
</commit_message>
<xml_diff>
--- a/EDU GRAPH-API Summary.pptx
+++ b/EDU GRAPH-API Summary.pptx
@@ -347,7 +347,7 @@
               <a:rPr lang="en-US" smtClean="0">
                 <a:latin typeface="Segoe UI" pitchFamily="34" charset="0"/>
               </a:rPr>
-              <a:t>2/6/2017 8:46 AM</a:t>
+              <a:t>2/9/2017 17:18</a:t>
             </a:fld>
             <a:endParaRPr lang="en-US" dirty="0">
               <a:latin typeface="Segoe UI" pitchFamily="34" charset="0"/>
@@ -630,7 +630,7 @@
           <a:p>
             <a:fld id="{38EEC551-8CDA-4EB6-89BB-2A86C9F091C8}" type="datetime8">
               <a:rPr lang="en-US" smtClean="0"/>
-              <a:t>2/6/2017 8:46 AM</a:t>
+              <a:t>2/9/2017 17:18</a:t>
             </a:fld>
             <a:endParaRPr lang="en-US" dirty="0"/>
           </a:p>
@@ -994,7 +994,7 @@
           <a:p>
             <a:fld id="{C6996B83-60CF-42A8-BA06-F99D0BEC30B3}" type="datetime1">
               <a:rPr lang="en-US" smtClean="0"/>
-              <a:t>2/6/2017</a:t>
+              <a:t>2/9/2017</a:t>
             </a:fld>
             <a:endParaRPr lang="en-US" dirty="0"/>
           </a:p>
@@ -1201,7 +1201,7 @@
           <a:p>
             <a:fld id="{9F00D60D-1703-4D24-8308-FEE06A50A69C}" type="datetime1">
               <a:rPr lang="en-US" smtClean="0"/>
-              <a:t>2/6/2017</a:t>
+              <a:t>2/9/2017</a:t>
             </a:fld>
             <a:endParaRPr lang="en-US" dirty="0"/>
           </a:p>
@@ -1386,7 +1386,7 @@
           <a:p>
             <a:fld id="{9F00D60D-1703-4D24-8308-FEE06A50A69C}" type="datetime1">
               <a:rPr lang="en-US" smtClean="0"/>
-              <a:t>2/6/2017</a:t>
+              <a:t>2/9/2017</a:t>
             </a:fld>
             <a:endParaRPr lang="en-US" dirty="0"/>
           </a:p>
@@ -1571,7 +1571,7 @@
           <a:p>
             <a:fld id="{9F00D60D-1703-4D24-8308-FEE06A50A69C}" type="datetime1">
               <a:rPr lang="en-US" smtClean="0"/>
-              <a:t>2/6/2017</a:t>
+              <a:t>2/9/2017</a:t>
             </a:fld>
             <a:endParaRPr lang="en-US" dirty="0"/>
           </a:p>
@@ -1756,7 +1756,7 @@
           <a:p>
             <a:fld id="{9F00D60D-1703-4D24-8308-FEE06A50A69C}" type="datetime1">
               <a:rPr lang="en-US" smtClean="0"/>
-              <a:t>2/6/2017</a:t>
+              <a:t>2/9/2017</a:t>
             </a:fld>
             <a:endParaRPr lang="en-US" dirty="0"/>
           </a:p>
@@ -1941,7 +1941,7 @@
           <a:p>
             <a:fld id="{9F00D60D-1703-4D24-8308-FEE06A50A69C}" type="datetime1">
               <a:rPr lang="en-US" smtClean="0"/>
-              <a:t>2/6/2017</a:t>
+              <a:t>2/9/2017</a:t>
             </a:fld>
             <a:endParaRPr lang="en-US" dirty="0"/>
           </a:p>
@@ -2126,7 +2126,7 @@
           <a:p>
             <a:fld id="{9F00D60D-1703-4D24-8308-FEE06A50A69C}" type="datetime1">
               <a:rPr lang="en-US" smtClean="0"/>
-              <a:t>2/6/2017</a:t>
+              <a:t>2/9/2017</a:t>
             </a:fld>
             <a:endParaRPr lang="en-US" dirty="0"/>
           </a:p>
@@ -2311,7 +2311,7 @@
           <a:p>
             <a:fld id="{9F00D60D-1703-4D24-8308-FEE06A50A69C}" type="datetime1">
               <a:rPr lang="en-US" smtClean="0"/>
-              <a:t>2/6/2017</a:t>
+              <a:t>2/9/2017</a:t>
             </a:fld>
             <a:endParaRPr lang="en-US" dirty="0"/>
           </a:p>
@@ -2496,7 +2496,7 @@
           <a:p>
             <a:fld id="{9F00D60D-1703-4D24-8308-FEE06A50A69C}" type="datetime1">
               <a:rPr lang="en-US" smtClean="0"/>
-              <a:t>2/6/2017</a:t>
+              <a:t>2/9/2017</a:t>
             </a:fld>
             <a:endParaRPr lang="en-US" dirty="0"/>
           </a:p>
@@ -2681,7 +2681,7 @@
           <a:p>
             <a:fld id="{9F00D60D-1703-4D24-8308-FEE06A50A69C}" type="datetime1">
               <a:rPr lang="en-US" smtClean="0"/>
-              <a:t>2/6/2017</a:t>
+              <a:t>2/9/2017</a:t>
             </a:fld>
             <a:endParaRPr lang="en-US" dirty="0"/>
           </a:p>
@@ -2843,7 +2843,7 @@
           <a:p>
             <a:fld id="{FCF63DAE-D37E-4C44-BD81-0E251F1BE300}" type="datetime1">
               <a:rPr lang="en-US" smtClean="0"/>
-              <a:t>2/6/2017</a:t>
+              <a:t>2/9/2017</a:t>
             </a:fld>
             <a:endParaRPr lang="en-US" dirty="0"/>
           </a:p>
@@ -3028,7 +3028,7 @@
           <a:p>
             <a:fld id="{B079C3B8-7366-4A44-A34B-3977080C19E7}" type="datetime1">
               <a:rPr lang="en-US" smtClean="0"/>
-              <a:t>2/6/2017</a:t>
+              <a:t>2/9/2017</a:t>
             </a:fld>
             <a:endParaRPr lang="en-US" dirty="0"/>
           </a:p>
@@ -3213,7 +3213,7 @@
           <a:p>
             <a:fld id="{FCF63DAE-D37E-4C44-BD81-0E251F1BE300}" type="datetime1">
               <a:rPr lang="en-US" smtClean="0"/>
-              <a:t>2/6/2017</a:t>
+              <a:t>2/9/2017</a:t>
             </a:fld>
             <a:endParaRPr lang="en-US" dirty="0"/>
           </a:p>
@@ -3425,7 +3425,7 @@
           <a:p>
             <a:fld id="{38EEC551-8CDA-4EB6-89BB-2A86C9F091C8}" type="datetime8">
               <a:rPr lang="en-US" smtClean="0"/>
-              <a:t>2/6/2017 8:46 AM</a:t>
+              <a:t>2/9/2017 17:18</a:t>
             </a:fld>
             <a:endParaRPr lang="en-US" dirty="0"/>
           </a:p>
@@ -3614,7 +3614,7 @@
           <a:p>
             <a:fld id="{38EEC551-8CDA-4EB6-89BB-2A86C9F091C8}" type="datetime8">
               <a:rPr lang="en-US" smtClean="0"/>
-              <a:t>2/6/2017 8:46 AM</a:t>
+              <a:t>2/9/2017 17:18</a:t>
             </a:fld>
             <a:endParaRPr lang="en-US" dirty="0"/>
           </a:p>
@@ -3803,7 +3803,7 @@
           <a:p>
             <a:fld id="{38EEC551-8CDA-4EB6-89BB-2A86C9F091C8}" type="datetime8">
               <a:rPr lang="en-US" smtClean="0"/>
-              <a:t>2/6/2017 8:46 AM</a:t>
+              <a:t>2/9/2017 17:18</a:t>
             </a:fld>
             <a:endParaRPr lang="en-US" dirty="0"/>
           </a:p>
@@ -3965,7 +3965,7 @@
           <a:p>
             <a:fld id="{FCF63DAE-D37E-4C44-BD81-0E251F1BE300}" type="datetime1">
               <a:rPr lang="en-US" smtClean="0"/>
-              <a:t>2/6/2017</a:t>
+              <a:t>2/9/2017</a:t>
             </a:fld>
             <a:endParaRPr lang="en-US" dirty="0"/>
           </a:p>
@@ -4150,7 +4150,7 @@
           <a:p>
             <a:fld id="{FCF63DAE-D37E-4C44-BD81-0E251F1BE300}" type="datetime1">
               <a:rPr lang="en-US" smtClean="0"/>
-              <a:t>2/6/2017</a:t>
+              <a:t>2/9/2017</a:t>
             </a:fld>
             <a:endParaRPr lang="en-US" dirty="0"/>
           </a:p>
@@ -4358,7 +4358,7 @@
           <a:p>
             <a:fld id="{9F00D60D-1703-4D24-8308-FEE06A50A69C}" type="datetime1">
               <a:rPr lang="en-US" smtClean="0"/>
-              <a:t>2/6/2017</a:t>
+              <a:t>2/9/2017</a:t>
             </a:fld>
             <a:endParaRPr lang="en-US" dirty="0"/>
           </a:p>
@@ -4543,7 +4543,7 @@
           <a:p>
             <a:fld id="{9F00D60D-1703-4D24-8308-FEE06A50A69C}" type="datetime1">
               <a:rPr lang="en-US" smtClean="0"/>
-              <a:t>2/6/2017</a:t>
+              <a:t>2/9/2017</a:t>
             </a:fld>
             <a:endParaRPr lang="en-US" dirty="0"/>
           </a:p>
@@ -4728,7 +4728,7 @@
           <a:p>
             <a:fld id="{9F00D60D-1703-4D24-8308-FEE06A50A69C}" type="datetime1">
               <a:rPr lang="en-US" smtClean="0"/>
-              <a:t>2/6/2017</a:t>
+              <a:t>2/9/2017</a:t>
             </a:fld>
             <a:endParaRPr lang="en-US" dirty="0"/>
           </a:p>
@@ -4913,7 +4913,7 @@
           <a:p>
             <a:fld id="{9F00D60D-1703-4D24-8308-FEE06A50A69C}" type="datetime1">
               <a:rPr lang="en-US" smtClean="0"/>
-              <a:t>2/6/2017</a:t>
+              <a:t>2/9/2017</a:t>
             </a:fld>
             <a:endParaRPr lang="en-US" dirty="0"/>
           </a:p>
@@ -5098,7 +5098,7 @@
           <a:p>
             <a:fld id="{9F00D60D-1703-4D24-8308-FEE06A50A69C}" type="datetime1">
               <a:rPr lang="en-US" smtClean="0"/>
-              <a:t>2/6/2017</a:t>
+              <a:t>2/9/2017</a:t>
             </a:fld>
             <a:endParaRPr lang="en-US" dirty="0"/>
           </a:p>
@@ -5283,7 +5283,7 @@
           <a:p>
             <a:fld id="{9F00D60D-1703-4D24-8308-FEE06A50A69C}" type="datetime1">
               <a:rPr lang="en-US" smtClean="0"/>
-              <a:t>2/6/2017</a:t>
+              <a:t>2/9/2017</a:t>
             </a:fld>
             <a:endParaRPr lang="en-US" dirty="0"/>
           </a:p>
@@ -17340,9 +17340,48 @@
           <a:chExt cx="0" cy="0"/>
         </a:xfrm>
       </p:grpSpPr>
+      <p:sp>
+        <p:nvSpPr>
+          <p:cNvPr id="2" name="AutoShape 2" descr="https://github.com/TylerLu/EDUGraphAPI/raw/master/Images/auth-flow-local-login.png"/>
+          <p:cNvSpPr>
+            <a:spLocks noChangeAspect="1" noChangeArrowheads="1"/>
+          </p:cNvSpPr>
+          <p:nvPr/>
+        </p:nvSpPr>
+        <p:spPr bwMode="auto">
+          <a:xfrm>
+            <a:off x="6065837" y="3344862"/>
+            <a:ext cx="3962399" cy="3962399"/>
+          </a:xfrm>
+          <a:prstGeom prst="rect">
+            <a:avLst/>
+          </a:prstGeom>
+          <a:noFill/>
+          <a:extLst>
+            <a:ext uri="{909E8E84-426E-40DD-AFC4-6F175D3DCCD1}">
+              <a14:hiddenFill xmlns:a14="http://schemas.microsoft.com/office/drawing/2010/main">
+                <a:solidFill>
+                  <a:srgbClr val="FFFFFF"/>
+                </a:solidFill>
+              </a14:hiddenFill>
+            </a:ext>
+          </a:extLst>
+        </p:spPr>
+        <p:txBody>
+          <a:bodyPr vert="horz" wrap="square" lIns="91440" tIns="45720" rIns="91440" bIns="45720" numCol="1" anchor="t" anchorCtr="0" compatLnSpc="1">
+            <a:prstTxWarp prst="textNoShape">
+              <a:avLst/>
+            </a:prstTxWarp>
+          </a:bodyPr>
+          <a:lstStyle/>
+          <a:p>
+            <a:endParaRPr lang="en-US"/>
+          </a:p>
+        </p:txBody>
+      </p:sp>
       <p:pic>
         <p:nvPicPr>
-          <p:cNvPr id="11272" name="Picture 8" descr="https://github.com/TylerLu/EDUGraphAPI/raw/master/Images/auth-flow-local-login.png"/>
+          <p:cNvPr id="1028" name="Picture 4" descr="https://github.com/TylerLu/EDUGraphAPI/raw/master/Images/auth-flow-local-login.png"/>
           <p:cNvPicPr>
             <a:picLocks noChangeAspect="1" noChangeArrowheads="1"/>
           </p:cNvPicPr>
@@ -17363,8 +17402,8 @@
         </p:blipFill>
         <p:spPr bwMode="auto">
           <a:xfrm>
-            <a:off x="198437" y="220662"/>
-            <a:ext cx="12045881" cy="6606692"/>
+            <a:off x="139328" y="951990"/>
+            <a:ext cx="12140777" cy="4983671"/>
           </a:xfrm>
           <a:prstGeom prst="rect">
             <a:avLst/>
@@ -17527,7 +17566,7 @@
       </p:grpSpPr>
       <p:pic>
         <p:nvPicPr>
-          <p:cNvPr id="15362" name="Picture 2" descr="https://github.com/TylerLu/EDUGraphAPI/raw/master/Images/auth-flow-o365-login.png"/>
+          <p:cNvPr id="2050" name="Picture 2" descr="https://github.com/TylerLu/EDUGraphAPI/raw/master/Images/auth-flow-o365-login.png"/>
           <p:cNvPicPr>
             <a:picLocks noChangeAspect="1" noChangeArrowheads="1"/>
           </p:cNvPicPr>
@@ -17548,8 +17587,8 @@
         </p:blipFill>
         <p:spPr bwMode="auto">
           <a:xfrm>
-            <a:off x="155487" y="296862"/>
-            <a:ext cx="12111576" cy="6477000"/>
+            <a:off x="164253" y="398700"/>
+            <a:ext cx="12110952" cy="6186667"/>
           </a:xfrm>
           <a:prstGeom prst="rect">
             <a:avLst/>
@@ -22730,6 +22769,12 @@
 </file>
 
 <file path=customXml/item1.xml><?xml version="1.0" encoding="utf-8"?>
+<p:properties xmlns:p="http://schemas.microsoft.com/office/2006/metadata/properties" xmlns:xsi="http://www.w3.org/2001/XMLSchema-instance" xmlns:pc="http://schemas.microsoft.com/office/infopath/2007/PartnerControls">
+  <documentManagement/>
+</p:properties>
+</file>
+
+<file path=customXml/item2.xml><?xml version="1.0" encoding="utf-8"?>
 <ct:contentTypeSchema xmlns:ct="http://schemas.microsoft.com/office/2006/metadata/contentType" xmlns:ma="http://schemas.microsoft.com/office/2006/metadata/properties/metaAttributes" ct:_="" ma:_="" ma:contentTypeName="Document" ma:contentTypeID="0x01010053433B08FA9EE742BB667ECEF5AA0226" ma:contentTypeVersion="4" ma:contentTypeDescription="Create a new document." ma:contentTypeScope="" ma:versionID="898350153c3cb7409c9d00c11df4aa1a">
   <xsd:schema xmlns:xsd="http://www.w3.org/2001/XMLSchema" xmlns:xs="http://www.w3.org/2001/XMLSchema" xmlns:p="http://schemas.microsoft.com/office/2006/metadata/properties" xmlns:ns2="09eba053-c572-4474-974d-b0bef0e9174f" targetNamespace="http://schemas.microsoft.com/office/2006/metadata/properties" ma:root="true" ma:fieldsID="f69afda497831ad76ed280df00c0bf48" ns2:_="">
     <xsd:import namespace="09eba053-c572-4474-974d-b0bef0e9174f"/>
@@ -22891,12 +22936,6 @@
 </ct:contentTypeSchema>
 </file>
 
-<file path=customXml/item2.xml><?xml version="1.0" encoding="utf-8"?>
-<p:properties xmlns:p="http://schemas.microsoft.com/office/2006/metadata/properties" xmlns:xsi="http://www.w3.org/2001/XMLSchema-instance" xmlns:pc="http://schemas.microsoft.com/office/infopath/2007/PartnerControls">
-  <documentManagement/>
-</p:properties>
-</file>
-
 <file path=customXml/item3.xml><?xml version="1.0" encoding="utf-8"?>
 <?mso-contentType ?>
 <FormTemplates xmlns="http://schemas.microsoft.com/sharepoint/v3/contenttype/forms">
@@ -22907,6 +22946,22 @@
 </file>
 
 <file path=customXml/itemProps1.xml><?xml version="1.0" encoding="utf-8"?>
+<ds:datastoreItem xmlns:ds="http://schemas.openxmlformats.org/officeDocument/2006/customXml" ds:itemID="{479EF7F2-79F0-4950-9137-4016BE64CE46}">
+  <ds:schemaRefs>
+    <ds:schemaRef ds:uri="http://purl.org/dc/terms/"/>
+    <ds:schemaRef ds:uri="http://schemas.openxmlformats.org/package/2006/metadata/core-properties"/>
+    <ds:schemaRef ds:uri="http://schemas.microsoft.com/office/2006/documentManagement/types"/>
+    <ds:schemaRef ds:uri="http://purl.org/dc/dcmitype/"/>
+    <ds:schemaRef ds:uri="http://schemas.microsoft.com/office/infopath/2007/PartnerControls"/>
+    <ds:schemaRef ds:uri="http://purl.org/dc/elements/1.1/"/>
+    <ds:schemaRef ds:uri="http://schemas.microsoft.com/office/2006/metadata/properties"/>
+    <ds:schemaRef ds:uri="09eba053-c572-4474-974d-b0bef0e9174f"/>
+    <ds:schemaRef ds:uri="http://www.w3.org/XML/1998/namespace"/>
+  </ds:schemaRefs>
+</ds:datastoreItem>
+</file>
+
+<file path=customXml/itemProps2.xml><?xml version="1.0" encoding="utf-8"?>
 <ds:datastoreItem xmlns:ds="http://schemas.openxmlformats.org/officeDocument/2006/customXml" ds:itemID="{55F7FE33-E5CA-47B4-B8F6-126891A96CF6}">
   <ds:schemaRefs>
     <ds:schemaRef ds:uri="http://schemas.microsoft.com/office/2006/metadata/contentType"/>
@@ -22924,22 +22979,6 @@
 </ds:datastoreItem>
 </file>
 
-<file path=customXml/itemProps2.xml><?xml version="1.0" encoding="utf-8"?>
-<ds:datastoreItem xmlns:ds="http://schemas.openxmlformats.org/officeDocument/2006/customXml" ds:itemID="{479EF7F2-79F0-4950-9137-4016BE64CE46}">
-  <ds:schemaRefs>
-    <ds:schemaRef ds:uri="http://purl.org/dc/terms/"/>
-    <ds:schemaRef ds:uri="http://schemas.openxmlformats.org/package/2006/metadata/core-properties"/>
-    <ds:schemaRef ds:uri="http://schemas.microsoft.com/office/2006/documentManagement/types"/>
-    <ds:schemaRef ds:uri="http://purl.org/dc/dcmitype/"/>
-    <ds:schemaRef ds:uri="http://schemas.microsoft.com/office/infopath/2007/PartnerControls"/>
-    <ds:schemaRef ds:uri="http://purl.org/dc/elements/1.1/"/>
-    <ds:schemaRef ds:uri="http://schemas.microsoft.com/office/2006/metadata/properties"/>
-    <ds:schemaRef ds:uri="09eba053-c572-4474-974d-b0bef0e9174f"/>
-    <ds:schemaRef ds:uri="http://www.w3.org/XML/1998/namespace"/>
-  </ds:schemaRefs>
-</ds:datastoreItem>
-</file>
-
 <file path=customXml/itemProps3.xml><?xml version="1.0" encoding="utf-8"?>
 <ds:datastoreItem xmlns:ds="http://schemas.openxmlformats.org/officeDocument/2006/customXml" ds:itemID="{41543473-98BF-41A8-AEE8-AF1C274C4DD8}">
   <ds:schemaRefs>

</xml_diff>